<commit_message>
Make it run well and create readme file.
</commit_message>
<xml_diff>
--- a/spec/a.pptx
+++ b/spec/a.pptx
@@ -247,7 +247,7 @@
           <a:p>
             <a:fld id="{77324A50-F531-4161-B274-F57934302FD1}" type="datetimeFigureOut">
               <a:rPr lang="zh-CN" altLang="en-US" smtClean="0"/>
-              <a:t>2017/6/1</a:t>
+              <a:t>2017/6/3</a:t>
             </a:fld>
             <a:endParaRPr lang="zh-CN" altLang="en-US"/>
           </a:p>
@@ -417,7 +417,7 @@
           <a:p>
             <a:fld id="{77324A50-F531-4161-B274-F57934302FD1}" type="datetimeFigureOut">
               <a:rPr lang="zh-CN" altLang="en-US" smtClean="0"/>
-              <a:t>2017/6/1</a:t>
+              <a:t>2017/6/3</a:t>
             </a:fld>
             <a:endParaRPr lang="zh-CN" altLang="en-US"/>
           </a:p>
@@ -597,7 +597,7 @@
           <a:p>
             <a:fld id="{77324A50-F531-4161-B274-F57934302FD1}" type="datetimeFigureOut">
               <a:rPr lang="zh-CN" altLang="en-US" smtClean="0"/>
-              <a:t>2017/6/1</a:t>
+              <a:t>2017/6/3</a:t>
             </a:fld>
             <a:endParaRPr lang="zh-CN" altLang="en-US"/>
           </a:p>
@@ -767,7 +767,7 @@
           <a:p>
             <a:fld id="{77324A50-F531-4161-B274-F57934302FD1}" type="datetimeFigureOut">
               <a:rPr lang="zh-CN" altLang="en-US" smtClean="0"/>
-              <a:t>2017/6/1</a:t>
+              <a:t>2017/6/3</a:t>
             </a:fld>
             <a:endParaRPr lang="zh-CN" altLang="en-US"/>
           </a:p>
@@ -1013,7 +1013,7 @@
           <a:p>
             <a:fld id="{77324A50-F531-4161-B274-F57934302FD1}" type="datetimeFigureOut">
               <a:rPr lang="zh-CN" altLang="en-US" smtClean="0"/>
-              <a:t>2017/6/1</a:t>
+              <a:t>2017/6/3</a:t>
             </a:fld>
             <a:endParaRPr lang="zh-CN" altLang="en-US"/>
           </a:p>
@@ -1245,7 +1245,7 @@
           <a:p>
             <a:fld id="{77324A50-F531-4161-B274-F57934302FD1}" type="datetimeFigureOut">
               <a:rPr lang="zh-CN" altLang="en-US" smtClean="0"/>
-              <a:t>2017/6/1</a:t>
+              <a:t>2017/6/3</a:t>
             </a:fld>
             <a:endParaRPr lang="zh-CN" altLang="en-US"/>
           </a:p>
@@ -1612,7 +1612,7 @@
           <a:p>
             <a:fld id="{77324A50-F531-4161-B274-F57934302FD1}" type="datetimeFigureOut">
               <a:rPr lang="zh-CN" altLang="en-US" smtClean="0"/>
-              <a:t>2017/6/1</a:t>
+              <a:t>2017/6/3</a:t>
             </a:fld>
             <a:endParaRPr lang="zh-CN" altLang="en-US"/>
           </a:p>
@@ -1730,7 +1730,7 @@
           <a:p>
             <a:fld id="{77324A50-F531-4161-B274-F57934302FD1}" type="datetimeFigureOut">
               <a:rPr lang="zh-CN" altLang="en-US" smtClean="0"/>
-              <a:t>2017/6/1</a:t>
+              <a:t>2017/6/3</a:t>
             </a:fld>
             <a:endParaRPr lang="zh-CN" altLang="en-US"/>
           </a:p>
@@ -1825,7 +1825,7 @@
           <a:p>
             <a:fld id="{77324A50-F531-4161-B274-F57934302FD1}" type="datetimeFigureOut">
               <a:rPr lang="zh-CN" altLang="en-US" smtClean="0"/>
-              <a:t>2017/6/1</a:t>
+              <a:t>2017/6/3</a:t>
             </a:fld>
             <a:endParaRPr lang="zh-CN" altLang="en-US"/>
           </a:p>
@@ -2102,7 +2102,7 @@
           <a:p>
             <a:fld id="{77324A50-F531-4161-B274-F57934302FD1}" type="datetimeFigureOut">
               <a:rPr lang="zh-CN" altLang="en-US" smtClean="0"/>
-              <a:t>2017/6/1</a:t>
+              <a:t>2017/6/3</a:t>
             </a:fld>
             <a:endParaRPr lang="zh-CN" altLang="en-US"/>
           </a:p>
@@ -2355,7 +2355,7 @@
           <a:p>
             <a:fld id="{77324A50-F531-4161-B274-F57934302FD1}" type="datetimeFigureOut">
               <a:rPr lang="zh-CN" altLang="en-US" smtClean="0"/>
-              <a:t>2017/6/1</a:t>
+              <a:t>2017/6/3</a:t>
             </a:fld>
             <a:endParaRPr lang="zh-CN" altLang="en-US"/>
           </a:p>
@@ -2568,7 +2568,7 @@
           <a:p>
             <a:fld id="{77324A50-F531-4161-B274-F57934302FD1}" type="datetimeFigureOut">
               <a:rPr lang="zh-CN" altLang="en-US" smtClean="0"/>
-              <a:t>2017/6/1</a:t>
+              <a:t>2017/6/3</a:t>
             </a:fld>
             <a:endParaRPr lang="zh-CN" altLang="en-US"/>
           </a:p>
@@ -3086,8 +3086,16 @@
           <a:lstStyle/>
           <a:p>
             <a:r>
+              <a:rPr lang="en-US" altLang="zh-CN" dirty="0" err="1" smtClean="0">
+                <a:solidFill>
+                  <a:srgbClr val="FF0000"/>
+                </a:solidFill>
+              </a:rPr>
+              <a:t>D</a:t>
+            </a:r>
+            <a:r>
               <a:rPr lang="en-US" altLang="zh-CN" dirty="0" err="1" smtClean="0"/>
-              <a:t>Docker</a:t>
+              <a:t>ocker</a:t>
             </a:r>
             <a:r>
               <a:rPr lang="zh-CN" altLang="en-US" dirty="0" smtClean="0"/>

</xml_diff>